<commit_message>
RAS - no modif
Je pensais qu'on avait fais une erreur mais je crois que c'est bon !
</commit_message>
<xml_diff>
--- a/doc/Rapport_Devoir1.pptx
+++ b/doc/Rapport_Devoir1.pptx
@@ -124,7 +124,7 @@
 <file path=ppt/revisionInfo.xml><?xml version="1.0" encoding="utf-8"?>
 <p1510:revInfo xmlns:a="http://schemas.openxmlformats.org/drawingml/2006/main" xmlns:r="http://schemas.openxmlformats.org/officeDocument/2006/relationships" xmlns:p1510="http://schemas.microsoft.com/office/powerpoint/2015/10/main">
   <p1510:revLst>
-    <p1510:client id="{8625411A-B743-4065-8137-36E899DC5753}" v="1605" dt="2025-02-05T21:05:21.542"/>
+    <p1510:client id="{8625411A-B743-4065-8137-36E899DC5753}" v="1611" dt="2025-02-06T18:53:35.674"/>
   </p1510:revLst>
 </p1510:revInfo>
 </file>
@@ -134,7 +134,7 @@
   <pc:docChgLst>
     <pc:chgData name="François GLEYZON" userId="a2d04f23f7faf3ef" providerId="LiveId" clId="{8625411A-B743-4065-8137-36E899DC5753}"/>
     <pc:docChg chg="undo custSel addSld delSld modSld">
-      <pc:chgData name="François GLEYZON" userId="a2d04f23f7faf3ef" providerId="LiveId" clId="{8625411A-B743-4065-8137-36E899DC5753}" dt="2025-02-05T21:05:43.590" v="4304" actId="14100"/>
+      <pc:chgData name="François GLEYZON" userId="a2d04f23f7faf3ef" providerId="LiveId" clId="{8625411A-B743-4065-8137-36E899DC5753}" dt="2025-02-06T18:54:35.477" v="4531" actId="20577"/>
       <pc:docMkLst>
         <pc:docMk/>
       </pc:docMkLst>
@@ -150,30 +150,6 @@
             <pc:docMk/>
             <pc:sldMk cId="2487955664" sldId="257"/>
             <ac:spMk id="2" creationId="{0DD9D8E2-6A02-3C17-6B4A-972E3FEF8B78}"/>
-          </ac:spMkLst>
-        </pc:spChg>
-        <pc:spChg chg="add del mod">
-          <ac:chgData name="François GLEYZON" userId="a2d04f23f7faf3ef" providerId="LiveId" clId="{8625411A-B743-4065-8137-36E899DC5753}" dt="2025-02-04T18:52:07.300" v="1908" actId="478"/>
-          <ac:spMkLst>
-            <pc:docMk/>
-            <pc:sldMk cId="2487955664" sldId="257"/>
-            <ac:spMk id="3" creationId="{E62431D9-2636-A7B1-898F-02A5DB31DD57}"/>
-          </ac:spMkLst>
-        </pc:spChg>
-        <pc:spChg chg="add mod">
-          <ac:chgData name="François GLEYZON" userId="a2d04f23f7faf3ef" providerId="LiveId" clId="{8625411A-B743-4065-8137-36E899DC5753}" dt="2025-02-04T18:29:29.338" v="685"/>
-          <ac:spMkLst>
-            <pc:docMk/>
-            <pc:sldMk cId="2487955664" sldId="257"/>
-            <ac:spMk id="4" creationId="{579C9CB9-D7ED-45E0-9EA8-85F9E8F6AD6B}"/>
-          </ac:spMkLst>
-        </pc:spChg>
-        <pc:spChg chg="add mod">
-          <ac:chgData name="François GLEYZON" userId="a2d04f23f7faf3ef" providerId="LiveId" clId="{8625411A-B743-4065-8137-36E899DC5753}" dt="2025-02-04T18:29:29.338" v="685"/>
-          <ac:spMkLst>
-            <pc:docMk/>
-            <pc:sldMk cId="2487955664" sldId="257"/>
-            <ac:spMk id="5" creationId="{53107436-BD84-D769-4A71-8458FB70265E}"/>
           </ac:spMkLst>
         </pc:spChg>
         <pc:spChg chg="add mod">
@@ -231,14 +207,6 @@
           <pc:docMk/>
           <pc:sldMk cId="3497435959" sldId="258"/>
         </pc:sldMkLst>
-        <pc:spChg chg="add del mod">
-          <ac:chgData name="François GLEYZON" userId="a2d04f23f7faf3ef" providerId="LiveId" clId="{8625411A-B743-4065-8137-36E899DC5753}" dt="2025-02-04T18:52:11.340" v="1910" actId="478"/>
-          <ac:spMkLst>
-            <pc:docMk/>
-            <pc:sldMk cId="3497435959" sldId="258"/>
-            <ac:spMk id="2" creationId="{9980E12F-47BB-7010-959B-353A90CC8151}"/>
-          </ac:spMkLst>
-        </pc:spChg>
         <pc:spChg chg="add mod">
           <ac:chgData name="François GLEYZON" userId="a2d04f23f7faf3ef" providerId="LiveId" clId="{8625411A-B743-4065-8137-36E899DC5753}" dt="2025-02-04T18:33:54.751" v="902" actId="14100"/>
           <ac:spMkLst>
@@ -269,14 +237,6 @@
             <pc:docMk/>
             <pc:sldMk cId="3497435959" sldId="258"/>
             <ac:spMk id="7" creationId="{0DE0C8D9-3B6A-5353-D429-49011476A1F8}"/>
-          </ac:spMkLst>
-        </pc:spChg>
-        <pc:spChg chg="add mod">
-          <ac:chgData name="François GLEYZON" userId="a2d04f23f7faf3ef" providerId="LiveId" clId="{8625411A-B743-4065-8137-36E899DC5753}" dt="2025-02-04T18:35:26.611" v="1048"/>
-          <ac:spMkLst>
-            <pc:docMk/>
-            <pc:sldMk cId="3497435959" sldId="258"/>
-            <ac:spMk id="8" creationId="{5C14979E-CF8D-8EC2-5F59-1EA677872EBD}"/>
           </ac:spMkLst>
         </pc:spChg>
         <pc:spChg chg="add mod">
@@ -317,14 +277,6 @@
             <pc:docMk/>
             <pc:sldMk cId="3497435959" sldId="258"/>
             <ac:spMk id="13" creationId="{3C68DC94-F6BA-F627-DAD0-C1726F459CF5}"/>
-          </ac:spMkLst>
-        </pc:spChg>
-        <pc:spChg chg="add del mod">
-          <ac:chgData name="François GLEYZON" userId="a2d04f23f7faf3ef" providerId="LiveId" clId="{8625411A-B743-4065-8137-36E899DC5753}" dt="2025-02-04T18:39:56.024" v="1318"/>
-          <ac:spMkLst>
-            <pc:docMk/>
-            <pc:sldMk cId="3497435959" sldId="258"/>
-            <ac:spMk id="14" creationId="{683E47A3-07A6-0B32-FF6E-2344FBEE3BCA}"/>
           </ac:spMkLst>
         </pc:spChg>
         <pc:spChg chg="add mod">
@@ -678,8 +630,8 @@
           </ac:picMkLst>
         </pc:picChg>
       </pc:sldChg>
-      <pc:sldChg chg="addSp modSp mod">
-        <pc:chgData name="François GLEYZON" userId="a2d04f23f7faf3ef" providerId="LiveId" clId="{8625411A-B743-4065-8137-36E899DC5753}" dt="2025-02-05T21:05:43.590" v="4304" actId="14100"/>
+      <pc:sldChg chg="addSp delSp modSp mod">
+        <pc:chgData name="François GLEYZON" userId="a2d04f23f7faf3ef" providerId="LiveId" clId="{8625411A-B743-4065-8137-36E899DC5753}" dt="2025-02-06T18:54:35.477" v="4531" actId="20577"/>
         <pc:sldMkLst>
           <pc:docMk/>
           <pc:sldMk cId="1452944335" sldId="261"/>
@@ -765,11 +717,27 @@
           </ac:spMkLst>
         </pc:spChg>
         <pc:spChg chg="add mod">
-          <ac:chgData name="François GLEYZON" userId="a2d04f23f7faf3ef" providerId="LiveId" clId="{8625411A-B743-4065-8137-36E899DC5753}" dt="2025-02-05T21:05:43.590" v="4304" actId="14100"/>
+          <ac:chgData name="François GLEYZON" userId="a2d04f23f7faf3ef" providerId="LiveId" clId="{8625411A-B743-4065-8137-36E899DC5753}" dt="2025-02-06T18:54:35.477" v="4531" actId="20577"/>
           <ac:spMkLst>
             <pc:docMk/>
             <pc:sldMk cId="1452944335" sldId="261"/>
             <ac:spMk id="12" creationId="{2443DA39-C273-D2B8-F9E1-87B2F44BDC42}"/>
+          </ac:spMkLst>
+        </pc:spChg>
+        <pc:spChg chg="add del mod">
+          <ac:chgData name="François GLEYZON" userId="a2d04f23f7faf3ef" providerId="LiveId" clId="{8625411A-B743-4065-8137-36E899DC5753}" dt="2025-02-06T18:54:02.693" v="4467" actId="478"/>
+          <ac:spMkLst>
+            <pc:docMk/>
+            <pc:sldMk cId="1452944335" sldId="261"/>
+            <ac:spMk id="13" creationId="{C5B0B460-539A-B138-8DED-7EBE78A05B9F}"/>
+          </ac:spMkLst>
+        </pc:spChg>
+        <pc:spChg chg="add del mod">
+          <ac:chgData name="François GLEYZON" userId="a2d04f23f7faf3ef" providerId="LiveId" clId="{8625411A-B743-4065-8137-36E899DC5753}" dt="2025-02-06T18:54:01.947" v="4466" actId="478"/>
+          <ac:spMkLst>
+            <pc:docMk/>
+            <pc:sldMk cId="1452944335" sldId="261"/>
+            <ac:spMk id="14" creationId="{2D00753C-DF92-A883-5D99-CD649DDFF88A}"/>
           </ac:spMkLst>
         </pc:spChg>
       </pc:sldChg>
@@ -994,14 +962,6 @@
             <ac:spMk id="39" creationId="{AECA565B-75E5-1F68-434E-112D93E38360}"/>
           </ac:spMkLst>
         </pc:spChg>
-        <pc:picChg chg="add del">
-          <ac:chgData name="François GLEYZON" userId="a2d04f23f7faf3ef" providerId="LiveId" clId="{8625411A-B743-4065-8137-36E899DC5753}" dt="2025-02-04T18:51:58.221" v="1907" actId="478"/>
-          <ac:picMkLst>
-            <pc:docMk/>
-            <pc:sldMk cId="1966793551" sldId="265"/>
-            <ac:picMk id="38" creationId="{A105F045-C80A-4125-CDB1-74BE250F1943}"/>
-          </ac:picMkLst>
-        </pc:picChg>
         <pc:cxnChg chg="add mod">
           <ac:chgData name="François GLEYZON" userId="a2d04f23f7faf3ef" providerId="LiveId" clId="{8625411A-B743-4065-8137-36E899DC5753}" dt="2025-02-04T18:20:39.044" v="149" actId="1038"/>
           <ac:cxnSpMkLst>
@@ -1362,7 +1322,7 @@
           <a:p>
             <a:fld id="{CEFDEF93-0E3A-4A89-BC16-F38BAE82060D}" type="datetimeFigureOut">
               <a:rPr lang="en-GB" smtClean="0"/>
-              <a:t>05/02/2025</a:t>
+              <a:t>06/02/2025</a:t>
             </a:fld>
             <a:endParaRPr lang="en-GB"/>
           </a:p>
@@ -1562,7 +1522,7 @@
           <a:p>
             <a:fld id="{CEFDEF93-0E3A-4A89-BC16-F38BAE82060D}" type="datetimeFigureOut">
               <a:rPr lang="en-GB" smtClean="0"/>
-              <a:t>05/02/2025</a:t>
+              <a:t>06/02/2025</a:t>
             </a:fld>
             <a:endParaRPr lang="en-GB"/>
           </a:p>
@@ -1772,7 +1732,7 @@
           <a:p>
             <a:fld id="{CEFDEF93-0E3A-4A89-BC16-F38BAE82060D}" type="datetimeFigureOut">
               <a:rPr lang="en-GB" smtClean="0"/>
-              <a:t>05/02/2025</a:t>
+              <a:t>06/02/2025</a:t>
             </a:fld>
             <a:endParaRPr lang="en-GB"/>
           </a:p>
@@ -1972,7 +1932,7 @@
           <a:p>
             <a:fld id="{CEFDEF93-0E3A-4A89-BC16-F38BAE82060D}" type="datetimeFigureOut">
               <a:rPr lang="en-GB" smtClean="0"/>
-              <a:t>05/02/2025</a:t>
+              <a:t>06/02/2025</a:t>
             </a:fld>
             <a:endParaRPr lang="en-GB"/>
           </a:p>
@@ -2248,7 +2208,7 @@
           <a:p>
             <a:fld id="{CEFDEF93-0E3A-4A89-BC16-F38BAE82060D}" type="datetimeFigureOut">
               <a:rPr lang="en-GB" smtClean="0"/>
-              <a:t>05/02/2025</a:t>
+              <a:t>06/02/2025</a:t>
             </a:fld>
             <a:endParaRPr lang="en-GB"/>
           </a:p>
@@ -2516,7 +2476,7 @@
           <a:p>
             <a:fld id="{CEFDEF93-0E3A-4A89-BC16-F38BAE82060D}" type="datetimeFigureOut">
               <a:rPr lang="en-GB" smtClean="0"/>
-              <a:t>05/02/2025</a:t>
+              <a:t>06/02/2025</a:t>
             </a:fld>
             <a:endParaRPr lang="en-GB"/>
           </a:p>
@@ -2931,7 +2891,7 @@
           <a:p>
             <a:fld id="{CEFDEF93-0E3A-4A89-BC16-F38BAE82060D}" type="datetimeFigureOut">
               <a:rPr lang="en-GB" smtClean="0"/>
-              <a:t>05/02/2025</a:t>
+              <a:t>06/02/2025</a:t>
             </a:fld>
             <a:endParaRPr lang="en-GB"/>
           </a:p>
@@ -3073,7 +3033,7 @@
           <a:p>
             <a:fld id="{CEFDEF93-0E3A-4A89-BC16-F38BAE82060D}" type="datetimeFigureOut">
               <a:rPr lang="en-GB" smtClean="0"/>
-              <a:t>05/02/2025</a:t>
+              <a:t>06/02/2025</a:t>
             </a:fld>
             <a:endParaRPr lang="en-GB"/>
           </a:p>
@@ -3186,7 +3146,7 @@
           <a:p>
             <a:fld id="{CEFDEF93-0E3A-4A89-BC16-F38BAE82060D}" type="datetimeFigureOut">
               <a:rPr lang="en-GB" smtClean="0"/>
-              <a:t>05/02/2025</a:t>
+              <a:t>06/02/2025</a:t>
             </a:fld>
             <a:endParaRPr lang="en-GB"/>
           </a:p>
@@ -3499,7 +3459,7 @@
           <a:p>
             <a:fld id="{CEFDEF93-0E3A-4A89-BC16-F38BAE82060D}" type="datetimeFigureOut">
               <a:rPr lang="en-GB" smtClean="0"/>
-              <a:t>05/02/2025</a:t>
+              <a:t>06/02/2025</a:t>
             </a:fld>
             <a:endParaRPr lang="en-GB"/>
           </a:p>
@@ -3788,7 +3748,7 @@
           <a:p>
             <a:fld id="{CEFDEF93-0E3A-4A89-BC16-F38BAE82060D}" type="datetimeFigureOut">
               <a:rPr lang="en-GB" smtClean="0"/>
-              <a:t>05/02/2025</a:t>
+              <a:t>06/02/2025</a:t>
             </a:fld>
             <a:endParaRPr lang="en-GB"/>
           </a:p>
@@ -4031,7 +3991,7 @@
           <a:p>
             <a:fld id="{CEFDEF93-0E3A-4A89-BC16-F38BAE82060D}" type="datetimeFigureOut">
               <a:rPr lang="en-GB" smtClean="0"/>
-              <a:t>05/02/2025</a:t>
+              <a:t>06/02/2025</a:t>
             </a:fld>
             <a:endParaRPr lang="en-GB"/>
           </a:p>
@@ -14487,8 +14447,8 @@
           </p:sp>
         </mc:Fallback>
       </mc:AlternateContent>
-      <mc:AlternateContent xmlns:mc="http://schemas.openxmlformats.org/markup-compatibility/2006">
-        <mc:Choice xmlns:a14="http://schemas.microsoft.com/office/drawing/2010/main" Requires="a14">
+      <mc:AlternateContent xmlns:mc="http://schemas.openxmlformats.org/markup-compatibility/2006" xmlns:a14="http://schemas.microsoft.com/office/drawing/2010/main">
+        <mc:Choice Requires="a14">
           <p:sp>
             <p:nvSpPr>
               <p:cNvPr id="14" name="TextBox 13">
@@ -16209,7 +16169,7 @@
             </p:txBody>
           </p:sp>
         </mc:Choice>
-        <mc:Fallback>
+        <mc:Fallback xmlns="">
           <p:sp>
             <p:nvSpPr>
               <p:cNvPr id="14" name="TextBox 13">
@@ -16254,8 +16214,8 @@
           </p:sp>
         </mc:Fallback>
       </mc:AlternateContent>
-      <mc:AlternateContent xmlns:mc="http://schemas.openxmlformats.org/markup-compatibility/2006">
-        <mc:Choice xmlns:a14="http://schemas.microsoft.com/office/drawing/2010/main" Requires="a14">
+      <mc:AlternateContent xmlns:mc="http://schemas.openxmlformats.org/markup-compatibility/2006" xmlns:a14="http://schemas.microsoft.com/office/drawing/2010/main">
+        <mc:Choice Requires="a14">
           <p:sp>
             <p:nvSpPr>
               <p:cNvPr id="13" name="TextBox 12">
@@ -16470,7 +16430,7 @@
             </p:txBody>
           </p:sp>
         </mc:Choice>
-        <mc:Fallback>
+        <mc:Fallback xmlns="">
           <p:sp>
             <p:nvSpPr>
               <p:cNvPr id="13" name="TextBox 12">
@@ -16515,8 +16475,8 @@
           </p:sp>
         </mc:Fallback>
       </mc:AlternateContent>
-      <mc:AlternateContent xmlns:mc="http://schemas.openxmlformats.org/markup-compatibility/2006">
-        <mc:Choice xmlns:a14="http://schemas.microsoft.com/office/drawing/2010/main" Requires="a14">
+      <mc:AlternateContent xmlns:mc="http://schemas.openxmlformats.org/markup-compatibility/2006" xmlns:a14="http://schemas.microsoft.com/office/drawing/2010/main">
+        <mc:Choice Requires="a14">
           <p:sp>
             <p:nvSpPr>
               <p:cNvPr id="15" name="TextBox 14">
@@ -16545,6 +16505,7 @@
               </a:bodyPr>
               <a:lstStyle/>
               <a:p>
+                <a:pPr/>
                 <a14:m>
                   <m:oMathPara xmlns:m="http://schemas.openxmlformats.org/officeDocument/2006/math">
                     <m:oMathParaPr>
@@ -17926,7 +17887,7 @@
             </p:txBody>
           </p:sp>
         </mc:Choice>
-        <mc:Fallback>
+        <mc:Fallback xmlns="">
           <p:sp>
             <p:nvSpPr>
               <p:cNvPr id="15" name="TextBox 14">
@@ -18536,8 +18497,8 @@
           </a:p>
         </p:txBody>
       </p:sp>
-      <mc:AlternateContent xmlns:mc="http://schemas.openxmlformats.org/markup-compatibility/2006">
-        <mc:Choice xmlns:a14="http://schemas.microsoft.com/office/drawing/2010/main" Requires="a14">
+      <mc:AlternateContent xmlns:mc="http://schemas.openxmlformats.org/markup-compatibility/2006" xmlns:a14="http://schemas.microsoft.com/office/drawing/2010/main">
+        <mc:Choice Requires="a14">
           <p:sp>
             <p:nvSpPr>
               <p:cNvPr id="25" name="TextBox 24">
@@ -18688,7 +18649,7 @@
             </p:txBody>
           </p:sp>
         </mc:Choice>
-        <mc:Fallback>
+        <mc:Fallback xmlns="">
           <p:sp>
             <p:nvSpPr>
               <p:cNvPr id="25" name="TextBox 24">
@@ -18995,8 +18956,8 @@
           </a:p>
         </p:txBody>
       </p:sp>
-      <mc:AlternateContent xmlns:mc="http://schemas.openxmlformats.org/markup-compatibility/2006">
-        <mc:Choice xmlns:a14="http://schemas.microsoft.com/office/drawing/2010/main" Requires="a14">
+      <mc:AlternateContent xmlns:mc="http://schemas.openxmlformats.org/markup-compatibility/2006" xmlns:a14="http://schemas.microsoft.com/office/drawing/2010/main">
+        <mc:Choice Requires="a14">
           <p:sp>
             <p:nvSpPr>
               <p:cNvPr id="13" name="TextBox 12">
@@ -19038,7 +18999,7 @@
                     <m:sSub>
                       <m:sSubPr>
                         <m:ctrlPr>
-                          <a:rPr lang="fr-FR" b="0" i="0" smtClean="0">
+                          <a:rPr lang="fr-FR" b="0" i="1" smtClean="0">
                             <a:latin typeface="Cambria Math" panose="02040503050406030204" pitchFamily="18" charset="0"/>
                             <a:cs typeface="Times New Roman" panose="02020603050405020304" pitchFamily="18" charset="0"/>
                           </a:rPr>
@@ -19083,7 +19044,7 @@
             </p:txBody>
           </p:sp>
         </mc:Choice>
-        <mc:Fallback>
+        <mc:Fallback xmlns="">
           <p:sp>
             <p:nvSpPr>
               <p:cNvPr id="13" name="TextBox 12">
@@ -19128,8 +19089,8 @@
           </p:sp>
         </mc:Fallback>
       </mc:AlternateContent>
-      <mc:AlternateContent xmlns:mc="http://schemas.openxmlformats.org/markup-compatibility/2006">
-        <mc:Choice xmlns:a14="http://schemas.microsoft.com/office/drawing/2010/main" Requires="a14">
+      <mc:AlternateContent xmlns:mc="http://schemas.openxmlformats.org/markup-compatibility/2006" xmlns:a14="http://schemas.microsoft.com/office/drawing/2010/main">
+        <mc:Choice Requires="a14">
           <p:sp>
             <p:nvSpPr>
               <p:cNvPr id="14" name="TextBox 13">
@@ -19171,7 +19132,7 @@
                     <m:sSub>
                       <m:sSubPr>
                         <m:ctrlPr>
-                          <a:rPr lang="fr-FR" b="0" i="0" smtClean="0">
+                          <a:rPr lang="fr-FR" b="0" i="1" smtClean="0">
                             <a:latin typeface="Cambria Math" panose="02040503050406030204" pitchFamily="18" charset="0"/>
                             <a:cs typeface="Times New Roman" panose="02020603050405020304" pitchFamily="18" charset="0"/>
                           </a:rPr>
@@ -19216,7 +19177,7 @@
             </p:txBody>
           </p:sp>
         </mc:Choice>
-        <mc:Fallback>
+        <mc:Fallback xmlns="">
           <p:sp>
             <p:nvSpPr>
               <p:cNvPr id="14" name="TextBox 13">
@@ -19261,8 +19222,8 @@
           </p:sp>
         </mc:Fallback>
       </mc:AlternateContent>
-      <mc:AlternateContent xmlns:mc="http://schemas.openxmlformats.org/markup-compatibility/2006">
-        <mc:Choice xmlns:a14="http://schemas.microsoft.com/office/drawing/2010/main" Requires="a14">
+      <mc:AlternateContent xmlns:mc="http://schemas.openxmlformats.org/markup-compatibility/2006" xmlns:a14="http://schemas.microsoft.com/office/drawing/2010/main">
+        <mc:Choice Requires="a14">
           <p:sp>
             <p:nvSpPr>
               <p:cNvPr id="15" name="TextBox 14">
@@ -19304,7 +19265,7 @@
                     <m:sSub>
                       <m:sSubPr>
                         <m:ctrlPr>
-                          <a:rPr lang="fr-FR" b="0" i="0" smtClean="0">
+                          <a:rPr lang="fr-FR" b="0" i="1" smtClean="0">
                             <a:latin typeface="Cambria Math" panose="02040503050406030204" pitchFamily="18" charset="0"/>
                             <a:ea typeface="Cambria Math" panose="02040503050406030204" pitchFamily="18" charset="0"/>
                             <a:cs typeface="Times New Roman" panose="02020603050405020304" pitchFamily="18" charset="0"/>
@@ -19363,7 +19324,7 @@
             </p:txBody>
           </p:sp>
         </mc:Choice>
-        <mc:Fallback>
+        <mc:Fallback xmlns="">
           <p:sp>
             <p:nvSpPr>
               <p:cNvPr id="15" name="TextBox 14">
@@ -19408,8 +19369,8 @@
           </p:sp>
         </mc:Fallback>
       </mc:AlternateContent>
-      <mc:AlternateContent xmlns:mc="http://schemas.openxmlformats.org/markup-compatibility/2006">
-        <mc:Choice xmlns:a14="http://schemas.microsoft.com/office/drawing/2010/main" Requires="a14">
+      <mc:AlternateContent xmlns:mc="http://schemas.openxmlformats.org/markup-compatibility/2006" xmlns:a14="http://schemas.microsoft.com/office/drawing/2010/main">
+        <mc:Choice Requires="a14">
           <p:sp>
             <p:nvSpPr>
               <p:cNvPr id="16" name="TextBox 15">
@@ -19495,7 +19456,7 @@
             </p:txBody>
           </p:sp>
         </mc:Choice>
-        <mc:Fallback>
+        <mc:Fallback xmlns="">
           <p:sp>
             <p:nvSpPr>
               <p:cNvPr id="16" name="TextBox 15">
@@ -19772,8 +19733,8 @@
           </a:p>
         </p:txBody>
       </p:sp>
-      <mc:AlternateContent xmlns:mc="http://schemas.openxmlformats.org/markup-compatibility/2006">
-        <mc:Choice xmlns:a14="http://schemas.microsoft.com/office/drawing/2010/main" Requires="a14">
+      <mc:AlternateContent xmlns:mc="http://schemas.openxmlformats.org/markup-compatibility/2006" xmlns:a14="http://schemas.microsoft.com/office/drawing/2010/main">
+        <mc:Choice Requires="a14">
           <p:sp>
             <p:nvSpPr>
               <p:cNvPr id="6" name="TextBox 5">
@@ -19993,7 +19954,7 @@
             </p:txBody>
           </p:sp>
         </mc:Choice>
-        <mc:Fallback>
+        <mc:Fallback xmlns="">
           <p:sp>
             <p:nvSpPr>
               <p:cNvPr id="6" name="TextBox 5">
@@ -20038,8 +19999,8 @@
           </p:sp>
         </mc:Fallback>
       </mc:AlternateContent>
-      <mc:AlternateContent xmlns:mc="http://schemas.openxmlformats.org/markup-compatibility/2006">
-        <mc:Choice xmlns:a14="http://schemas.microsoft.com/office/drawing/2010/main" Requires="a14">
+      <mc:AlternateContent xmlns:mc="http://schemas.openxmlformats.org/markup-compatibility/2006" xmlns:a14="http://schemas.microsoft.com/office/drawing/2010/main">
+        <mc:Choice Requires="a14">
           <p:sp>
             <p:nvSpPr>
               <p:cNvPr id="7" name="TextBox 6">
@@ -20309,7 +20270,7 @@
             </p:txBody>
           </p:sp>
         </mc:Choice>
-        <mc:Fallback>
+        <mc:Fallback xmlns="">
           <p:sp>
             <p:nvSpPr>
               <p:cNvPr id="7" name="TextBox 6">
@@ -20483,8 +20444,8 @@
           </a:p>
         </p:txBody>
       </p:sp>
-      <mc:AlternateContent xmlns:mc="http://schemas.openxmlformats.org/markup-compatibility/2006">
-        <mc:Choice xmlns:a14="http://schemas.microsoft.com/office/drawing/2010/main" Requires="a14">
+      <mc:AlternateContent xmlns:mc="http://schemas.openxmlformats.org/markup-compatibility/2006" xmlns:a14="http://schemas.microsoft.com/office/drawing/2010/main">
+        <mc:Choice Requires="a14">
           <p:sp>
             <p:nvSpPr>
               <p:cNvPr id="11" name="TextBox 10">
@@ -21142,7 +21103,7 @@
             </p:txBody>
           </p:sp>
         </mc:Choice>
-        <mc:Fallback>
+        <mc:Fallback xmlns="">
           <p:sp>
             <p:nvSpPr>
               <p:cNvPr id="11" name="TextBox 10">
@@ -21202,7 +21163,7 @@
         <p:spPr>
           <a:xfrm>
             <a:off x="0" y="2462969"/>
-            <a:ext cx="12192000" cy="369332"/>
+            <a:ext cx="12192000" cy="646331"/>
           </a:xfrm>
           <a:prstGeom prst="rect">
             <a:avLst/>
@@ -21221,7 +21182,7 @@
                 <a:latin typeface="Times New Roman" panose="02020603050405020304" pitchFamily="18" charset="0"/>
                 <a:cs typeface="Times New Roman" panose="02020603050405020304" pitchFamily="18" charset="0"/>
               </a:rPr>
-              <a:t>Les deux schémas étant d’ordre 2, il est attendu que l’ordre de convergence soit également d’ordre 2. </a:t>
+              <a:t>Les deux schémas étant d’ordre 2, il est attendu que l’ordre de convergence soit également d’ordre 2. De manière similaire à précédemment, on peut vérifier ce code.  </a:t>
             </a:r>
             <a:endParaRPr lang="en-GB" dirty="0">
               <a:latin typeface="Times New Roman" panose="02020603050405020304" pitchFamily="18" charset="0"/>

</xml_diff>

<commit_message>
Rédaction de la conclusion
</commit_message>
<xml_diff>
--- a/doc/Rapport_Devoir1.pptx
+++ b/doc/Rapport_Devoir1.pptx
@@ -133,7 +133,7 @@
 <file path=ppt/revisionInfo.xml><?xml version="1.0" encoding="utf-8"?>
 <p1510:revInfo xmlns:a="http://schemas.openxmlformats.org/drawingml/2006/main" xmlns:r="http://schemas.openxmlformats.org/officeDocument/2006/relationships" xmlns:p1510="http://schemas.microsoft.com/office/powerpoint/2015/10/main">
   <p1510:revLst>
-    <p1510:client id="{8625411A-B743-4065-8137-36E899DC5753}" v="3271" dt="2025-02-11T00:41:24.991"/>
+    <p1510:client id="{8625411A-B743-4065-8137-36E899DC5753}" v="3398" dt="2025-02-12T12:54:39.668"/>
   </p1510:revLst>
 </p1510:revInfo>
 </file>
@@ -143,7 +143,7 @@
   <pc:docChgLst>
     <pc:chgData name="François GLEYZON" userId="a2d04f23f7faf3ef" providerId="LiveId" clId="{8625411A-B743-4065-8137-36E899DC5753}"/>
     <pc:docChg chg="undo custSel addSld delSld modSld">
-      <pc:chgData name="François GLEYZON" userId="a2d04f23f7faf3ef" providerId="LiveId" clId="{8625411A-B743-4065-8137-36E899DC5753}" dt="2025-02-11T00:41:24.991" v="9398" actId="313"/>
+      <pc:chgData name="François GLEYZON" userId="a2d04f23f7faf3ef" providerId="LiveId" clId="{8625411A-B743-4065-8137-36E899DC5753}" dt="2025-02-12T12:55:53.209" v="10498" actId="208"/>
       <pc:docMkLst>
         <pc:docMk/>
       </pc:docMkLst>
@@ -736,7 +736,7 @@
         </pc:picChg>
       </pc:sldChg>
       <pc:sldChg chg="addSp delSp modSp mod">
-        <pc:chgData name="François GLEYZON" userId="a2d04f23f7faf3ef" providerId="LiveId" clId="{8625411A-B743-4065-8137-36E899DC5753}" dt="2025-02-08T18:01:04.860" v="6525"/>
+        <pc:chgData name="François GLEYZON" userId="a2d04f23f7faf3ef" providerId="LiveId" clId="{8625411A-B743-4065-8137-36E899DC5753}" dt="2025-02-12T12:49:57.499" v="9522" actId="313"/>
         <pc:sldMkLst>
           <pc:docMk/>
           <pc:sldMk cId="1063259523" sldId="260"/>
@@ -830,7 +830,7 @@
           </ac:spMkLst>
         </pc:spChg>
         <pc:spChg chg="add mod">
-          <ac:chgData name="François GLEYZON" userId="a2d04f23f7faf3ef" providerId="LiveId" clId="{8625411A-B743-4065-8137-36E899DC5753}" dt="2025-02-08T17:52:28.547" v="5610" actId="20577"/>
+          <ac:chgData name="François GLEYZON" userId="a2d04f23f7faf3ef" providerId="LiveId" clId="{8625411A-B743-4065-8137-36E899DC5753}" dt="2025-02-12T12:49:57.499" v="9522" actId="313"/>
           <ac:spMkLst>
             <pc:docMk/>
             <pc:sldMk cId="1063259523" sldId="260"/>
@@ -1188,7 +1188,7 @@
         </pc:picChg>
       </pc:sldChg>
       <pc:sldChg chg="addSp modSp mod">
-        <pc:chgData name="François GLEYZON" userId="a2d04f23f7faf3ef" providerId="LiveId" clId="{8625411A-B743-4065-8137-36E899DC5753}" dt="2025-02-08T18:12:31.623" v="7250" actId="20577"/>
+        <pc:chgData name="François GLEYZON" userId="a2d04f23f7faf3ef" providerId="LiveId" clId="{8625411A-B743-4065-8137-36E899DC5753}" dt="2025-02-12T12:55:53.209" v="10498" actId="208"/>
         <pc:sldMkLst>
           <pc:docMk/>
           <pc:sldMk cId="508563345" sldId="264"/>
@@ -1223,6 +1223,46 @@
             <pc:docMk/>
             <pc:sldMk cId="508563345" sldId="264"/>
             <ac:spMk id="5" creationId="{D2E50873-3ABD-E877-EB14-EB6279F4EA4F}"/>
+          </ac:spMkLst>
+        </pc:spChg>
+        <pc:spChg chg="add mod">
+          <ac:chgData name="François GLEYZON" userId="a2d04f23f7faf3ef" providerId="LiveId" clId="{8625411A-B743-4065-8137-36E899DC5753}" dt="2025-02-12T12:51:21.077" v="9588" actId="20577"/>
+          <ac:spMkLst>
+            <pc:docMk/>
+            <pc:sldMk cId="508563345" sldId="264"/>
+            <ac:spMk id="6" creationId="{C0FB229F-7FDE-60BB-7C9D-FA8C75D93FFE}"/>
+          </ac:spMkLst>
+        </pc:spChg>
+        <pc:spChg chg="add mod">
+          <ac:chgData name="François GLEYZON" userId="a2d04f23f7faf3ef" providerId="LiveId" clId="{8625411A-B743-4065-8137-36E899DC5753}" dt="2025-02-12T12:53:55.839" v="10131" actId="12"/>
+          <ac:spMkLst>
+            <pc:docMk/>
+            <pc:sldMk cId="508563345" sldId="264"/>
+            <ac:spMk id="7" creationId="{70CF15AE-9D08-54F9-6B23-DBA1C0275690}"/>
+          </ac:spMkLst>
+        </pc:spChg>
+        <pc:spChg chg="add mod">
+          <ac:chgData name="François GLEYZON" userId="a2d04f23f7faf3ef" providerId="LiveId" clId="{8625411A-B743-4065-8137-36E899DC5753}" dt="2025-02-12T12:53:52.933" v="10130" actId="12"/>
+          <ac:spMkLst>
+            <pc:docMk/>
+            <pc:sldMk cId="508563345" sldId="264"/>
+            <ac:spMk id="8" creationId="{3F71D19F-FB6D-FE38-AC51-717B965503B7}"/>
+          </ac:spMkLst>
+        </pc:spChg>
+        <pc:spChg chg="add mod">
+          <ac:chgData name="François GLEYZON" userId="a2d04f23f7faf3ef" providerId="LiveId" clId="{8625411A-B743-4065-8137-36E899DC5753}" dt="2025-02-12T12:55:53.209" v="10498" actId="208"/>
+          <ac:spMkLst>
+            <pc:docMk/>
+            <pc:sldMk cId="508563345" sldId="264"/>
+            <ac:spMk id="9" creationId="{1A3D098E-C0A1-7DE8-1262-2E4E31F8E4CB}"/>
+          </ac:spMkLst>
+        </pc:spChg>
+        <pc:spChg chg="add mod">
+          <ac:chgData name="François GLEYZON" userId="a2d04f23f7faf3ef" providerId="LiveId" clId="{8625411A-B743-4065-8137-36E899DC5753}" dt="2025-02-12T12:55:44.213" v="10495" actId="20577"/>
+          <ac:spMkLst>
+            <pc:docMk/>
+            <pc:sldMk cId="508563345" sldId="264"/>
+            <ac:spMk id="10" creationId="{1827829A-69C1-05E0-82FC-47D7A4E8CFA8}"/>
           </ac:spMkLst>
         </pc:spChg>
       </pc:sldChg>
@@ -1652,7 +1692,7 @@
           <a:p>
             <a:fld id="{536D1BE0-9163-4941-8556-7FE0B29195A4}" type="datetimeFigureOut">
               <a:rPr lang="en-GB" smtClean="0"/>
-              <a:t>10/02/2025</a:t>
+              <a:t>12/02/2025</a:t>
             </a:fld>
             <a:endParaRPr lang="en-GB"/>
           </a:p>
@@ -2153,7 +2193,7 @@
           <a:p>
             <a:fld id="{CEFDEF93-0E3A-4A89-BC16-F38BAE82060D}" type="datetimeFigureOut">
               <a:rPr lang="en-GB" smtClean="0"/>
-              <a:t>10/02/2025</a:t>
+              <a:t>12/02/2025</a:t>
             </a:fld>
             <a:endParaRPr lang="en-GB"/>
           </a:p>
@@ -2353,7 +2393,7 @@
           <a:p>
             <a:fld id="{CEFDEF93-0E3A-4A89-BC16-F38BAE82060D}" type="datetimeFigureOut">
               <a:rPr lang="en-GB" smtClean="0"/>
-              <a:t>10/02/2025</a:t>
+              <a:t>12/02/2025</a:t>
             </a:fld>
             <a:endParaRPr lang="en-GB"/>
           </a:p>
@@ -2563,7 +2603,7 @@
           <a:p>
             <a:fld id="{CEFDEF93-0E3A-4A89-BC16-F38BAE82060D}" type="datetimeFigureOut">
               <a:rPr lang="en-GB" smtClean="0"/>
-              <a:t>10/02/2025</a:t>
+              <a:t>12/02/2025</a:t>
             </a:fld>
             <a:endParaRPr lang="en-GB"/>
           </a:p>
@@ -2763,7 +2803,7 @@
           <a:p>
             <a:fld id="{CEFDEF93-0E3A-4A89-BC16-F38BAE82060D}" type="datetimeFigureOut">
               <a:rPr lang="en-GB" smtClean="0"/>
-              <a:t>10/02/2025</a:t>
+              <a:t>12/02/2025</a:t>
             </a:fld>
             <a:endParaRPr lang="en-GB"/>
           </a:p>
@@ -3039,7 +3079,7 @@
           <a:p>
             <a:fld id="{CEFDEF93-0E3A-4A89-BC16-F38BAE82060D}" type="datetimeFigureOut">
               <a:rPr lang="en-GB" smtClean="0"/>
-              <a:t>10/02/2025</a:t>
+              <a:t>12/02/2025</a:t>
             </a:fld>
             <a:endParaRPr lang="en-GB"/>
           </a:p>
@@ -3307,7 +3347,7 @@
           <a:p>
             <a:fld id="{CEFDEF93-0E3A-4A89-BC16-F38BAE82060D}" type="datetimeFigureOut">
               <a:rPr lang="en-GB" smtClean="0"/>
-              <a:t>10/02/2025</a:t>
+              <a:t>12/02/2025</a:t>
             </a:fld>
             <a:endParaRPr lang="en-GB"/>
           </a:p>
@@ -3722,7 +3762,7 @@
           <a:p>
             <a:fld id="{CEFDEF93-0E3A-4A89-BC16-F38BAE82060D}" type="datetimeFigureOut">
               <a:rPr lang="en-GB" smtClean="0"/>
-              <a:t>10/02/2025</a:t>
+              <a:t>12/02/2025</a:t>
             </a:fld>
             <a:endParaRPr lang="en-GB"/>
           </a:p>
@@ -3864,7 +3904,7 @@
           <a:p>
             <a:fld id="{CEFDEF93-0E3A-4A89-BC16-F38BAE82060D}" type="datetimeFigureOut">
               <a:rPr lang="en-GB" smtClean="0"/>
-              <a:t>10/02/2025</a:t>
+              <a:t>12/02/2025</a:t>
             </a:fld>
             <a:endParaRPr lang="en-GB"/>
           </a:p>
@@ -3977,7 +4017,7 @@
           <a:p>
             <a:fld id="{CEFDEF93-0E3A-4A89-BC16-F38BAE82060D}" type="datetimeFigureOut">
               <a:rPr lang="en-GB" smtClean="0"/>
-              <a:t>10/02/2025</a:t>
+              <a:t>12/02/2025</a:t>
             </a:fld>
             <a:endParaRPr lang="en-GB"/>
           </a:p>
@@ -4290,7 +4330,7 @@
           <a:p>
             <a:fld id="{CEFDEF93-0E3A-4A89-BC16-F38BAE82060D}" type="datetimeFigureOut">
               <a:rPr lang="en-GB" smtClean="0"/>
-              <a:t>10/02/2025</a:t>
+              <a:t>12/02/2025</a:t>
             </a:fld>
             <a:endParaRPr lang="en-GB"/>
           </a:p>
@@ -4579,7 +4619,7 @@
           <a:p>
             <a:fld id="{CEFDEF93-0E3A-4A89-BC16-F38BAE82060D}" type="datetimeFigureOut">
               <a:rPr lang="en-GB" smtClean="0"/>
-              <a:t>10/02/2025</a:t>
+              <a:t>12/02/2025</a:t>
             </a:fld>
             <a:endParaRPr lang="en-GB"/>
           </a:p>
@@ -4822,7 +4862,7 @@
           <a:p>
             <a:fld id="{CEFDEF93-0E3A-4A89-BC16-F38BAE82060D}" type="datetimeFigureOut">
               <a:rPr lang="en-GB" smtClean="0"/>
-              <a:t>10/02/2025</a:t>
+              <a:t>12/02/2025</a:t>
             </a:fld>
             <a:endParaRPr lang="en-GB"/>
           </a:p>
@@ -6030,6 +6070,235 @@
           <a:p>
             <a:pPr algn="ctr"/>
             <a:endParaRPr lang="en-GB"/>
+          </a:p>
+        </p:txBody>
+      </p:sp>
+      <p:sp>
+        <p:nvSpPr>
+          <p:cNvPr id="6" name="TextBox 5">
+            <a:extLst>
+              <a:ext uri="{FF2B5EF4-FFF2-40B4-BE49-F238E27FC236}">
+                <a16:creationId xmlns:a16="http://schemas.microsoft.com/office/drawing/2014/main" id="{C0FB229F-7FDE-60BB-7C9D-FA8C75D93FFE}"/>
+              </a:ext>
+            </a:extLst>
+          </p:cNvPr>
+          <p:cNvSpPr txBox="1"/>
+          <p:nvPr/>
+        </p:nvSpPr>
+        <p:spPr>
+          <a:xfrm>
+            <a:off x="-2" y="627468"/>
+            <a:ext cx="12192001" cy="369332"/>
+          </a:xfrm>
+          <a:prstGeom prst="rect">
+            <a:avLst/>
+          </a:prstGeom>
+          <a:noFill/>
+        </p:spPr>
+        <p:txBody>
+          <a:bodyPr wrap="square" rtlCol="0">
+            <a:spAutoFit/>
+          </a:bodyPr>
+          <a:lstStyle/>
+          <a:p>
+            <a:pPr algn="just"/>
+            <a:r>
+              <a:rPr lang="fr-FR" dirty="0">
+                <a:latin typeface="Times New Roman" panose="02020603050405020304" pitchFamily="18" charset="0"/>
+                <a:cs typeface="Times New Roman" panose="02020603050405020304" pitchFamily="18" charset="0"/>
+              </a:rPr>
+              <a:t>Pour conclure, ce devoir nous a permis de montrer : </a:t>
+            </a:r>
+            <a:endParaRPr lang="en-GB" dirty="0">
+              <a:latin typeface="Times New Roman" panose="02020603050405020304" pitchFamily="18" charset="0"/>
+              <a:cs typeface="Times New Roman" panose="02020603050405020304" pitchFamily="18" charset="0"/>
+            </a:endParaRPr>
+          </a:p>
+        </p:txBody>
+      </p:sp>
+      <p:sp>
+        <p:nvSpPr>
+          <p:cNvPr id="7" name="TextBox 6">
+            <a:extLst>
+              <a:ext uri="{FF2B5EF4-FFF2-40B4-BE49-F238E27FC236}">
+                <a16:creationId xmlns:a16="http://schemas.microsoft.com/office/drawing/2014/main" id="{70CF15AE-9D08-54F9-6B23-DBA1C0275690}"/>
+              </a:ext>
+            </a:extLst>
+          </p:cNvPr>
+          <p:cNvSpPr txBox="1"/>
+          <p:nvPr/>
+        </p:nvSpPr>
+        <p:spPr>
+          <a:xfrm>
+            <a:off x="6394493" y="1018963"/>
+            <a:ext cx="5662039" cy="1477328"/>
+          </a:xfrm>
+          <a:prstGeom prst="rect">
+            <a:avLst/>
+          </a:prstGeom>
+          <a:noFill/>
+        </p:spPr>
+        <p:txBody>
+          <a:bodyPr wrap="square" rtlCol="0">
+            <a:spAutoFit/>
+          </a:bodyPr>
+          <a:lstStyle/>
+          <a:p>
+            <a:pPr marL="285750" indent="-285750" algn="just">
+              <a:buFont typeface="Wingdings" panose="05000000000000000000" pitchFamily="2" charset="2"/>
+              <a:buChar char="§"/>
+            </a:pPr>
+            <a:r>
+              <a:rPr lang="fr-FR" noProof="0" dirty="0">
+                <a:latin typeface="Times New Roman" panose="02020603050405020304" pitchFamily="18" charset="0"/>
+                <a:cs typeface="Times New Roman" panose="02020603050405020304" pitchFamily="18" charset="0"/>
+              </a:rPr>
+              <a:t>Les limites de l’analyse de convergence de l’erreur de discrétisation. En effet, si les schémas de discrétisation sont uniformes et cohérent avec le problème traité, on peut trouver des résultats extrêmement bons (i.e. erreur de discrétisation très faible). </a:t>
+            </a:r>
+          </a:p>
+        </p:txBody>
+      </p:sp>
+      <p:sp>
+        <p:nvSpPr>
+          <p:cNvPr id="8" name="TextBox 7">
+            <a:extLst>
+              <a:ext uri="{FF2B5EF4-FFF2-40B4-BE49-F238E27FC236}">
+                <a16:creationId xmlns:a16="http://schemas.microsoft.com/office/drawing/2014/main" id="{3F71D19F-FB6D-FE38-AC51-717B965503B7}"/>
+              </a:ext>
+            </a:extLst>
+          </p:cNvPr>
+          <p:cNvSpPr txBox="1"/>
+          <p:nvPr/>
+        </p:nvSpPr>
+        <p:spPr>
+          <a:xfrm>
+            <a:off x="135469" y="996800"/>
+            <a:ext cx="5662039" cy="1200329"/>
+          </a:xfrm>
+          <a:prstGeom prst="rect">
+            <a:avLst/>
+          </a:prstGeom>
+          <a:noFill/>
+        </p:spPr>
+        <p:txBody>
+          <a:bodyPr wrap="square" rtlCol="0">
+            <a:spAutoFit/>
+          </a:bodyPr>
+          <a:lstStyle/>
+          <a:p>
+            <a:pPr marL="285750" indent="-285750" algn="just">
+              <a:buFont typeface="Wingdings" panose="05000000000000000000" pitchFamily="2" charset="2"/>
+              <a:buChar char="§"/>
+            </a:pPr>
+            <a:r>
+              <a:rPr lang="fr-FR" noProof="0" dirty="0">
+                <a:latin typeface="Times New Roman" panose="02020603050405020304" pitchFamily="18" charset="0"/>
+                <a:cs typeface="Times New Roman" panose="02020603050405020304" pitchFamily="18" charset="0"/>
+              </a:rPr>
+              <a:t>Comment fonctionne une analyse de convergence</a:t>
+            </a:r>
+            <a:r>
+              <a:rPr lang="fr-FR" dirty="0">
+                <a:latin typeface="Times New Roman" panose="02020603050405020304" pitchFamily="18" charset="0"/>
+                <a:cs typeface="Times New Roman" panose="02020603050405020304" pitchFamily="18" charset="0"/>
+              </a:rPr>
+              <a:t> dans le cas numéro 1. Nous avons pu comparer l’ordre de grandeurs théoriques formelles et l’ordre de convergence numérique afin de valider le code. </a:t>
+            </a:r>
+            <a:endParaRPr lang="fr-FR" noProof="0" dirty="0">
+              <a:latin typeface="Times New Roman" panose="02020603050405020304" pitchFamily="18" charset="0"/>
+              <a:cs typeface="Times New Roman" panose="02020603050405020304" pitchFamily="18" charset="0"/>
+            </a:endParaRPr>
+          </a:p>
+        </p:txBody>
+      </p:sp>
+      <p:sp>
+        <p:nvSpPr>
+          <p:cNvPr id="9" name="Right Brace 8">
+            <a:extLst>
+              <a:ext uri="{FF2B5EF4-FFF2-40B4-BE49-F238E27FC236}">
+                <a16:creationId xmlns:a16="http://schemas.microsoft.com/office/drawing/2014/main" id="{1A3D098E-C0A1-7DE8-1262-2E4E31F8E4CB}"/>
+              </a:ext>
+            </a:extLst>
+          </p:cNvPr>
+          <p:cNvSpPr/>
+          <p:nvPr/>
+        </p:nvSpPr>
+        <p:spPr>
+          <a:xfrm rot="5400000">
+            <a:off x="5941498" y="-3246679"/>
+            <a:ext cx="309004" cy="11921064"/>
+          </a:xfrm>
+          <a:prstGeom prst="rightBrace">
+            <a:avLst>
+              <a:gd name="adj1" fmla="val 90384"/>
+              <a:gd name="adj2" fmla="val 50000"/>
+            </a:avLst>
+          </a:prstGeom>
+          <a:ln w="57150">
+            <a:solidFill>
+              <a:srgbClr val="C00000"/>
+            </a:solidFill>
+          </a:ln>
+        </p:spPr>
+        <p:style>
+          <a:lnRef idx="2">
+            <a:schemeClr val="accent1"/>
+          </a:lnRef>
+          <a:fillRef idx="0">
+            <a:schemeClr val="accent1"/>
+          </a:fillRef>
+          <a:effectRef idx="1">
+            <a:schemeClr val="accent1"/>
+          </a:effectRef>
+          <a:fontRef idx="minor">
+            <a:schemeClr val="tx1"/>
+          </a:fontRef>
+        </p:style>
+        <p:txBody>
+          <a:bodyPr rtlCol="0" anchor="ctr"/>
+          <a:lstStyle/>
+          <a:p>
+            <a:pPr algn="ctr"/>
+            <a:endParaRPr lang="en-GB"/>
+          </a:p>
+        </p:txBody>
+      </p:sp>
+      <p:sp>
+        <p:nvSpPr>
+          <p:cNvPr id="10" name="TextBox 9">
+            <a:extLst>
+              <a:ext uri="{FF2B5EF4-FFF2-40B4-BE49-F238E27FC236}">
+                <a16:creationId xmlns:a16="http://schemas.microsoft.com/office/drawing/2014/main" id="{1827829A-69C1-05E0-82FC-47D7A4E8CFA8}"/>
+              </a:ext>
+            </a:extLst>
+          </p:cNvPr>
+          <p:cNvSpPr txBox="1"/>
+          <p:nvPr/>
+        </p:nvSpPr>
+        <p:spPr>
+          <a:xfrm>
+            <a:off x="2484643" y="3044562"/>
+            <a:ext cx="7222709" cy="1477328"/>
+          </a:xfrm>
+          <a:prstGeom prst="rect">
+            <a:avLst/>
+          </a:prstGeom>
+          <a:noFill/>
+        </p:spPr>
+        <p:txBody>
+          <a:bodyPr wrap="square" rtlCol="0">
+            <a:spAutoFit/>
+          </a:bodyPr>
+          <a:lstStyle/>
+          <a:p>
+            <a:pPr algn="just"/>
+            <a:r>
+              <a:rPr lang="fr-FR" dirty="0">
+                <a:latin typeface="Times New Roman" panose="02020603050405020304" pitchFamily="18" charset="0"/>
+                <a:cs typeface="Times New Roman" panose="02020603050405020304" pitchFamily="18" charset="0"/>
+              </a:rPr>
+              <a:t>L’analyse de convergence de l’erreur de discrétisation par convergence asymptotique est donc une méthode puissante afin de pouvoir valider un code. Néanmoins une bonne compréhension physique et numérique du problème est nécessaire afin de permettre une compréhension juste des résultats. </a:t>
+            </a:r>
           </a:p>
         </p:txBody>
       </p:sp>
@@ -21991,8 +22260,8 @@
           </p:sp>
         </mc:Fallback>
       </mc:AlternateContent>
-      <mc:AlternateContent xmlns:mc="http://schemas.openxmlformats.org/markup-compatibility/2006" xmlns:a14="http://schemas.microsoft.com/office/drawing/2010/main">
-        <mc:Choice Requires="a14">
+      <mc:AlternateContent xmlns:mc="http://schemas.openxmlformats.org/markup-compatibility/2006">
+        <mc:Choice xmlns:a14="http://schemas.microsoft.com/office/drawing/2010/main" Requires="a14">
           <p:sp>
             <p:nvSpPr>
               <p:cNvPr id="16" name="TextBox 15">
@@ -22008,7 +22277,7 @@
             <p:spPr>
               <a:xfrm>
                 <a:off x="5435599" y="2336801"/>
-                <a:ext cx="6620934" cy="2031325"/>
+                <a:ext cx="6620934" cy="2585323"/>
               </a:xfrm>
               <a:prstGeom prst="rect">
                 <a:avLst/>
@@ -22092,14 +22361,21 @@
                     <a:latin typeface="Times New Roman" panose="02020603050405020304" pitchFamily="18" charset="0"/>
                     <a:cs typeface="Times New Roman" panose="02020603050405020304" pitchFamily="18" charset="0"/>
                   </a:rPr>
-                  <a:t> : Même pour un grand nombre de chiffre significatif, il semble que l’ordre de convergence </a:t>
+                  <a:t> : </a:t>
+                </a:r>
+                <a:r>
+                  <a:rPr lang="fr-FR" noProof="0" dirty="0">
+                    <a:latin typeface="Times New Roman" panose="02020603050405020304" pitchFamily="18" charset="0"/>
+                    <a:cs typeface="Times New Roman" panose="02020603050405020304" pitchFamily="18" charset="0"/>
+                  </a:rPr>
+                  <a:t>Même pour un grand nombre de chiffre significatif, il semble que l’ordre de convergence </a:t>
                 </a:r>
                 <a14:m>
                   <m:oMath xmlns:m="http://schemas.openxmlformats.org/officeDocument/2006/math">
                     <m:sSub>
                       <m:sSubPr>
                         <m:ctrlPr>
-                          <a:rPr lang="fr-FR" b="0" i="1" smtClean="0">
+                          <a:rPr lang="fr-FR" b="0" i="1" noProof="0" smtClean="0">
                             <a:latin typeface="Cambria Math" panose="02040503050406030204" pitchFamily="18" charset="0"/>
                             <a:ea typeface="Cambria Math" panose="02040503050406030204" pitchFamily="18" charset="0"/>
                             <a:cs typeface="Times New Roman" panose="02020603050405020304" pitchFamily="18" charset="0"/>
@@ -22111,7 +22387,7 @@
                           <m:rPr>
                             <m:sty m:val="p"/>
                           </m:rPr>
-                          <a:rPr lang="fr-FR" b="0" i="0" smtClean="0">
+                          <a:rPr lang="fr-FR" b="0" i="0" noProof="0" smtClean="0">
                             <a:latin typeface="Cambria Math" panose="02040503050406030204" pitchFamily="18" charset="0"/>
                             <a:ea typeface="Cambria Math" panose="02040503050406030204" pitchFamily="18" charset="0"/>
                             <a:cs typeface="Times New Roman" panose="02020603050405020304" pitchFamily="18" charset="0"/>
@@ -22121,7 +22397,7 @@
                       </m:e>
                       <m:sub>
                         <m:r>
-                          <a:rPr lang="fr-FR" i="1">
+                          <a:rPr lang="fr-FR" i="1" noProof="0">
                             <a:latin typeface="Cambria Math" panose="02040503050406030204" pitchFamily="18" charset="0"/>
                             <a:ea typeface="Cambria Math" panose="02040503050406030204" pitchFamily="18" charset="0"/>
                             <a:cs typeface="Times New Roman" panose="02020603050405020304" pitchFamily="18" charset="0"/>
@@ -22133,31 +22409,66 @@
                   </m:oMath>
                 </a14:m>
                 <a:r>
-                  <a:rPr lang="en-GB" dirty="0">
+                  <a:rPr lang="fr-FR" noProof="0" dirty="0">
                     <a:latin typeface="Times New Roman" panose="02020603050405020304" pitchFamily="18" charset="0"/>
                     <a:cs typeface="Times New Roman" panose="02020603050405020304" pitchFamily="18" charset="0"/>
                   </a:rPr>
-                  <a:t> </a:t>
+                  <a:t> soit excellent. Avec des simulations pour 1000 et plus de nœuds, on arrive à montrer que </a:t>
                 </a:r>
+                <a14:m>
+                  <m:oMath xmlns:m="http://schemas.openxmlformats.org/officeDocument/2006/math">
+                    <m:sSub>
+                      <m:sSubPr>
+                        <m:ctrlPr>
+                          <a:rPr lang="fr-FR" i="1" noProof="0">
+                            <a:latin typeface="Cambria Math" panose="02040503050406030204" pitchFamily="18" charset="0"/>
+                            <a:ea typeface="Cambria Math" panose="02040503050406030204" pitchFamily="18" charset="0"/>
+                            <a:cs typeface="Times New Roman" panose="02020603050405020304" pitchFamily="18" charset="0"/>
+                          </a:rPr>
+                        </m:ctrlPr>
+                      </m:sSubPr>
+                      <m:e>
+                        <m:r>
+                          <m:rPr>
+                            <m:sty m:val="p"/>
+                          </m:rPr>
+                          <a:rPr lang="fr-FR" noProof="0">
+                            <a:latin typeface="Cambria Math" panose="02040503050406030204" pitchFamily="18" charset="0"/>
+                            <a:ea typeface="Cambria Math" panose="02040503050406030204" pitchFamily="18" charset="0"/>
+                            <a:cs typeface="Times New Roman" panose="02020603050405020304" pitchFamily="18" charset="0"/>
+                          </a:rPr>
+                          <m:t>L</m:t>
+                        </m:r>
+                      </m:e>
+                      <m:sub>
+                        <m:r>
+                          <a:rPr lang="fr-FR" i="1" noProof="0">
+                            <a:latin typeface="Cambria Math" panose="02040503050406030204" pitchFamily="18" charset="0"/>
+                            <a:ea typeface="Cambria Math" panose="02040503050406030204" pitchFamily="18" charset="0"/>
+                            <a:cs typeface="Times New Roman" panose="02020603050405020304" pitchFamily="18" charset="0"/>
+                          </a:rPr>
+                          <m:t>∞</m:t>
+                        </m:r>
+                      </m:sub>
+                    </m:sSub>
+                  </m:oMath>
+                </a14:m>
                 <a:r>
-                  <a:rPr lang="en-GB" dirty="0" err="1">
+                  <a:rPr lang="fr-FR" noProof="0" dirty="0">
                     <a:latin typeface="Times New Roman" panose="02020603050405020304" pitchFamily="18" charset="0"/>
                     <a:cs typeface="Times New Roman" panose="02020603050405020304" pitchFamily="18" charset="0"/>
                   </a:rPr>
-                  <a:t>soit</a:t>
+                  <a:t> n’est pas parfaitement égale à 1. </a:t>
                 </a:r>
-                <a:r>
-                  <a:rPr lang="en-GB" dirty="0">
-                    <a:latin typeface="Times New Roman" panose="02020603050405020304" pitchFamily="18" charset="0"/>
-                    <a:cs typeface="Times New Roman" panose="02020603050405020304" pitchFamily="18" charset="0"/>
-                  </a:rPr>
-                  <a:t> excellent. </a:t>
-                </a:r>
+                <a:endParaRPr lang="en-GB" dirty="0">
+                  <a:latin typeface="Times New Roman" panose="02020603050405020304" pitchFamily="18" charset="0"/>
+                  <a:cs typeface="Times New Roman" panose="02020603050405020304" pitchFamily="18" charset="0"/>
+                </a:endParaRPr>
               </a:p>
             </p:txBody>
           </p:sp>
         </mc:Choice>
-        <mc:Fallback xmlns="">
+        <mc:Fallback>
           <p:sp>
             <p:nvSpPr>
               <p:cNvPr id="16" name="TextBox 15">
@@ -22175,7 +22486,7 @@
             <p:spPr>
               <a:xfrm>
                 <a:off x="5435599" y="2336801"/>
-                <a:ext cx="6620934" cy="2031325"/>
+                <a:ext cx="6620934" cy="2585323"/>
               </a:xfrm>
               <a:prstGeom prst="rect">
                 <a:avLst/>
@@ -22183,7 +22494,7 @@
               <a:blipFill>
                 <a:blip r:embed="rId5"/>
                 <a:stretch>
-                  <a:fillRect l="-829" t="-1497" r="-737" b="-3593"/>
+                  <a:fillRect l="-829" t="-1179" r="-737" b="-2830"/>
                 </a:stretch>
               </a:blipFill>
             </p:spPr>
@@ -24541,8 +24852,8 @@
           </a:p>
         </p:txBody>
       </p:sp>
-      <mc:AlternateContent xmlns:mc="http://schemas.openxmlformats.org/markup-compatibility/2006">
-        <mc:Choice xmlns:a14="http://schemas.microsoft.com/office/drawing/2010/main" Requires="a14">
+      <mc:AlternateContent xmlns:mc="http://schemas.openxmlformats.org/markup-compatibility/2006" xmlns:a14="http://schemas.microsoft.com/office/drawing/2010/main">
+        <mc:Choice Requires="a14">
           <p:sp>
             <p:nvSpPr>
               <p:cNvPr id="17" name="TextBox 16">
@@ -24632,7 +24943,7 @@
             </p:txBody>
           </p:sp>
         </mc:Choice>
-        <mc:Fallback>
+        <mc:Fallback xmlns="">
           <p:sp>
             <p:nvSpPr>
               <p:cNvPr id="17" name="TextBox 16">
@@ -24984,8 +25295,8 @@
           </a:p>
         </p:txBody>
       </p:sp>
-      <mc:AlternateContent xmlns:mc="http://schemas.openxmlformats.org/markup-compatibility/2006">
-        <mc:Choice xmlns:a14="http://schemas.microsoft.com/office/drawing/2010/main" Requires="a14">
+      <mc:AlternateContent xmlns:mc="http://schemas.openxmlformats.org/markup-compatibility/2006" xmlns:a14="http://schemas.microsoft.com/office/drawing/2010/main">
+        <mc:Choice Requires="a14">
           <p:sp>
             <p:nvSpPr>
               <p:cNvPr id="18" name="TextBox 17">
@@ -25014,6 +25325,7 @@
               </a:bodyPr>
               <a:lstStyle/>
               <a:p>
+                <a:pPr/>
                 <a14:m>
                   <m:oMathPara xmlns:m="http://schemas.openxmlformats.org/officeDocument/2006/math">
                     <m:oMathParaPr>
@@ -25257,7 +25569,7 @@
                       <m:sSub>
                         <m:sSubPr>
                           <m:ctrlPr>
-                            <a:rPr lang="fr-FR" b="0" i="0" dirty="0" smtClean="0">
+                            <a:rPr lang="fr-FR" b="0" i="1" dirty="0" smtClean="0">
                               <a:latin typeface="Cambria Math" panose="02040503050406030204" pitchFamily="18" charset="0"/>
                             </a:rPr>
                           </m:ctrlPr>
@@ -25291,7 +25603,7 @@
                       <m:sSub>
                         <m:sSubPr>
                           <m:ctrlPr>
-                            <a:rPr lang="fr-FR" b="0" i="0" dirty="0" smtClean="0">
+                            <a:rPr lang="fr-FR" b="0" i="1" dirty="0" smtClean="0">
                               <a:latin typeface="Cambria Math" panose="02040503050406030204" pitchFamily="18" charset="0"/>
                             </a:rPr>
                           </m:ctrlPr>
@@ -25325,7 +25637,7 @@
                       <m:sSub>
                         <m:sSubPr>
                           <m:ctrlPr>
-                            <a:rPr lang="fr-FR" b="0" i="0" dirty="0" smtClean="0">
+                            <a:rPr lang="fr-FR" b="0" i="1" dirty="0" smtClean="0">
                               <a:latin typeface="Cambria Math" panose="02040503050406030204" pitchFamily="18" charset="0"/>
                             </a:rPr>
                           </m:ctrlPr>
@@ -25364,7 +25676,7 @@
             </p:txBody>
           </p:sp>
         </mc:Choice>
-        <mc:Fallback>
+        <mc:Fallback xmlns="">
           <p:sp>
             <p:nvSpPr>
               <p:cNvPr id="18" name="TextBox 17">
@@ -25720,8 +26032,8 @@
           </a:p>
         </p:txBody>
       </p:sp>
-      <mc:AlternateContent xmlns:mc="http://schemas.openxmlformats.org/markup-compatibility/2006">
-        <mc:Choice xmlns:a14="http://schemas.microsoft.com/office/drawing/2010/main" Requires="a14">
+      <mc:AlternateContent xmlns:mc="http://schemas.openxmlformats.org/markup-compatibility/2006" xmlns:a14="http://schemas.microsoft.com/office/drawing/2010/main">
+        <mc:Choice Requires="a14">
           <p:sp>
             <p:nvSpPr>
               <p:cNvPr id="10" name="TextBox 9">
@@ -25879,7 +26191,7 @@
             </p:txBody>
           </p:sp>
         </mc:Choice>
-        <mc:Fallback>
+        <mc:Fallback xmlns="">
           <p:sp>
             <p:nvSpPr>
               <p:cNvPr id="10" name="TextBox 9">
@@ -25967,8 +26279,8 @@
           </a:p>
         </p:txBody>
       </p:sp>
-      <mc:AlternateContent xmlns:mc="http://schemas.openxmlformats.org/markup-compatibility/2006">
-        <mc:Choice xmlns:a14="http://schemas.microsoft.com/office/drawing/2010/main" Requires="a14">
+      <mc:AlternateContent xmlns:mc="http://schemas.openxmlformats.org/markup-compatibility/2006" xmlns:a14="http://schemas.microsoft.com/office/drawing/2010/main">
+        <mc:Choice Requires="a14">
           <p:sp>
             <p:nvSpPr>
               <p:cNvPr id="15" name="TextBox 14">
@@ -26073,7 +26385,7 @@
             </p:txBody>
           </p:sp>
         </mc:Choice>
-        <mc:Fallback>
+        <mc:Fallback xmlns="">
           <p:sp>
             <p:nvSpPr>
               <p:cNvPr id="15" name="TextBox 14">

</xml_diff>